<commit_message>
adjust size and position of image
</commit_message>
<xml_diff>
--- a/imgs/raku_in_docker.pptx
+++ b/imgs/raku_in_docker.pptx
@@ -3045,8 +3045,8 @@
         </p:blipFill>
         <p:spPr>
           <a:xfrm>
-            <a:off x="2551816" y="2331917"/>
-            <a:ext cx="1777717" cy="1432011"/>
+            <a:off x="2542967" y="2392326"/>
+            <a:ext cx="1824176" cy="1392865"/>
           </a:xfrm>
           <a:prstGeom prst="rect">
             <a:avLst/>

</xml_diff>

<commit_message>
trivial change in images
</commit_message>
<xml_diff>
--- a/imgs/raku_in_docker.pptx
+++ b/imgs/raku_in_docker.pptx
@@ -2984,10 +2984,10 @@
       </p:grpSpPr>
       <p:pic>
         <p:nvPicPr>
-          <p:cNvPr id="7" name="Picture 6">
+          <p:cNvPr id="3" name="Picture 2">
             <a:extLst>
               <a:ext uri="{FF2B5EF4-FFF2-40B4-BE49-F238E27FC236}">
-                <a16:creationId xmlns:a16="http://schemas.microsoft.com/office/drawing/2014/main" id="{8A7F7D6C-96C4-451D-8F43-900A25DC185E}"/>
+                <a16:creationId xmlns:a16="http://schemas.microsoft.com/office/drawing/2014/main" id="{4B90C2DA-B872-46D3-A1D1-3AE9DFD1962E}"/>
               </a:ext>
             </a:extLst>
           </p:cNvPr>
@@ -3004,13 +3004,13 @@
               </a:ext>
             </a:extLst>
           </a:blip>
-          <a:srcRect r="56943"/>
+          <a:srcRect b="32426"/>
           <a:stretch/>
         </p:blipFill>
         <p:spPr>
           <a:xfrm>
-            <a:off x="1828800" y="2678935"/>
-            <a:ext cx="4057712" cy="2477859"/>
+            <a:off x="1635127" y="2500458"/>
+            <a:ext cx="4258880" cy="2569465"/>
           </a:xfrm>
           <a:prstGeom prst="rect">
             <a:avLst/>
@@ -3045,8 +3045,8 @@
         </p:blipFill>
         <p:spPr>
           <a:xfrm>
-            <a:off x="2542967" y="2392326"/>
-            <a:ext cx="1824176" cy="1392865"/>
+            <a:off x="2484208" y="2403181"/>
+            <a:ext cx="1713328" cy="1308226"/>
           </a:xfrm>
           <a:prstGeom prst="rect">
             <a:avLst/>

</xml_diff>